<commit_message>
updated presentation with image and flowchart
</commit_message>
<xml_diff>
--- a/techGine-presentation.pptx
+++ b/techGine-presentation.pptx
@@ -4,6 +4,9 @@
   <p:sldMasterIdLst>
     <p:sldMasterId id="2147483648" r:id="rId1"/>
   </p:sldMasterIdLst>
+  <p:notesMasterIdLst>
+    <p:notesMasterId r:id="rId9"/>
+  </p:notesMasterIdLst>
   <p:sldIdLst>
     <p:sldId id="256" r:id="rId2"/>
     <p:sldId id="260" r:id="rId3"/>
@@ -122,6 +125,841 @@
 <p1510:revInfo xmlns:a="http://schemas.openxmlformats.org/drawingml/2006/main" xmlns:r="http://schemas.openxmlformats.org/officeDocument/2006/relationships" xmlns:p1510="http://schemas.microsoft.com/office/powerpoint/2015/10/main"/>
 </file>
 
+<file path=ppt/notesMasters/notesMaster1.xml><?xml version="1.0" encoding="utf-8"?>
+<p:notesMaster xmlns:a="http://schemas.openxmlformats.org/drawingml/2006/main" xmlns:r="http://schemas.openxmlformats.org/officeDocument/2006/relationships" xmlns:p="http://schemas.openxmlformats.org/presentationml/2006/main">
+  <p:cSld>
+    <p:bg>
+      <p:bgRef idx="1001">
+        <a:schemeClr val="bg1"/>
+      </p:bgRef>
+    </p:bg>
+    <p:spTree>
+      <p:nvGrpSpPr>
+        <p:cNvPr id="1" name=""/>
+        <p:cNvGrpSpPr/>
+        <p:nvPr/>
+      </p:nvGrpSpPr>
+      <p:grpSpPr>
+        <a:xfrm>
+          <a:off x="0" y="0"/>
+          <a:ext cx="0" cy="0"/>
+          <a:chOff x="0" y="0"/>
+          <a:chExt cx="0" cy="0"/>
+        </a:xfrm>
+      </p:grpSpPr>
+      <p:sp>
+        <p:nvSpPr>
+          <p:cNvPr id="2" name="Header Placeholder 1"/>
+          <p:cNvSpPr>
+            <a:spLocks noGrp="1"/>
+          </p:cNvSpPr>
+          <p:nvPr>
+            <p:ph type="hdr" sz="quarter"/>
+          </p:nvPr>
+        </p:nvSpPr>
+        <p:spPr>
+          <a:xfrm>
+            <a:off x="0" y="0"/>
+            <a:ext cx="2971800" cy="458788"/>
+          </a:xfrm>
+          <a:prstGeom prst="rect">
+            <a:avLst/>
+          </a:prstGeom>
+        </p:spPr>
+        <p:txBody>
+          <a:bodyPr vert="horz" lIns="91440" tIns="45720" rIns="91440" bIns="45720" rtlCol="0"/>
+          <a:lstStyle>
+            <a:lvl1pPr algn="l">
+              <a:defRPr sz="1200"/>
+            </a:lvl1pPr>
+          </a:lstStyle>
+          <a:p>
+            <a:endParaRPr lang="en-US"/>
+          </a:p>
+        </p:txBody>
+      </p:sp>
+      <p:sp>
+        <p:nvSpPr>
+          <p:cNvPr id="3" name="Date Placeholder 2"/>
+          <p:cNvSpPr>
+            <a:spLocks noGrp="1"/>
+          </p:cNvSpPr>
+          <p:nvPr>
+            <p:ph type="dt" idx="1"/>
+          </p:nvPr>
+        </p:nvSpPr>
+        <p:spPr>
+          <a:xfrm>
+            <a:off x="3884613" y="0"/>
+            <a:ext cx="2971800" cy="458788"/>
+          </a:xfrm>
+          <a:prstGeom prst="rect">
+            <a:avLst/>
+          </a:prstGeom>
+        </p:spPr>
+        <p:txBody>
+          <a:bodyPr vert="horz" lIns="91440" tIns="45720" rIns="91440" bIns="45720" rtlCol="0"/>
+          <a:lstStyle>
+            <a:lvl1pPr algn="r">
+              <a:defRPr sz="1200"/>
+            </a:lvl1pPr>
+          </a:lstStyle>
+          <a:p>
+            <a:fld id="{CBC31221-8360-4F5A-B73E-BC156E283276}" type="datetimeFigureOut">
+              <a:rPr lang="en-US" smtClean="0"/>
+              <a:t>11/13/2017</a:t>
+            </a:fld>
+            <a:endParaRPr lang="en-US"/>
+          </a:p>
+        </p:txBody>
+      </p:sp>
+      <p:sp>
+        <p:nvSpPr>
+          <p:cNvPr id="4" name="Slide Image Placeholder 3"/>
+          <p:cNvSpPr>
+            <a:spLocks noGrp="1" noRot="1" noChangeAspect="1"/>
+          </p:cNvSpPr>
+          <p:nvPr>
+            <p:ph type="sldImg" idx="2"/>
+          </p:nvPr>
+        </p:nvSpPr>
+        <p:spPr>
+          <a:xfrm>
+            <a:off x="685800" y="1143000"/>
+            <a:ext cx="5486400" cy="3086100"/>
+          </a:xfrm>
+          <a:prstGeom prst="rect">
+            <a:avLst/>
+          </a:prstGeom>
+          <a:noFill/>
+          <a:ln w="12700">
+            <a:solidFill>
+              <a:prstClr val="black"/>
+            </a:solidFill>
+          </a:ln>
+        </p:spPr>
+        <p:txBody>
+          <a:bodyPr vert="horz" lIns="91440" tIns="45720" rIns="91440" bIns="45720" rtlCol="0" anchor="ctr"/>
+          <a:lstStyle/>
+          <a:p>
+            <a:endParaRPr lang="en-US"/>
+          </a:p>
+        </p:txBody>
+      </p:sp>
+      <p:sp>
+        <p:nvSpPr>
+          <p:cNvPr id="5" name="Notes Placeholder 4"/>
+          <p:cNvSpPr>
+            <a:spLocks noGrp="1"/>
+          </p:cNvSpPr>
+          <p:nvPr>
+            <p:ph type="body" sz="quarter" idx="3"/>
+          </p:nvPr>
+        </p:nvSpPr>
+        <p:spPr>
+          <a:xfrm>
+            <a:off x="685800" y="4400550"/>
+            <a:ext cx="5486400" cy="3600450"/>
+          </a:xfrm>
+          <a:prstGeom prst="rect">
+            <a:avLst/>
+          </a:prstGeom>
+        </p:spPr>
+        <p:txBody>
+          <a:bodyPr vert="horz" lIns="91440" tIns="45720" rIns="91440" bIns="45720" rtlCol="0"/>
+          <a:lstStyle/>
+          <a:p>
+            <a:pPr lvl="0"/>
+            <a:r>
+              <a:rPr lang="en-US"/>
+              <a:t>Edit Master text styles</a:t>
+            </a:r>
+          </a:p>
+          <a:p>
+            <a:pPr lvl="1"/>
+            <a:r>
+              <a:rPr lang="en-US"/>
+              <a:t>Second level</a:t>
+            </a:r>
+          </a:p>
+          <a:p>
+            <a:pPr lvl="2"/>
+            <a:r>
+              <a:rPr lang="en-US"/>
+              <a:t>Third level</a:t>
+            </a:r>
+          </a:p>
+          <a:p>
+            <a:pPr lvl="3"/>
+            <a:r>
+              <a:rPr lang="en-US"/>
+              <a:t>Fourth level</a:t>
+            </a:r>
+          </a:p>
+          <a:p>
+            <a:pPr lvl="4"/>
+            <a:r>
+              <a:rPr lang="en-US"/>
+              <a:t>Fifth level</a:t>
+            </a:r>
+          </a:p>
+        </p:txBody>
+      </p:sp>
+      <p:sp>
+        <p:nvSpPr>
+          <p:cNvPr id="6" name="Footer Placeholder 5"/>
+          <p:cNvSpPr>
+            <a:spLocks noGrp="1"/>
+          </p:cNvSpPr>
+          <p:nvPr>
+            <p:ph type="ftr" sz="quarter" idx="4"/>
+          </p:nvPr>
+        </p:nvSpPr>
+        <p:spPr>
+          <a:xfrm>
+            <a:off x="0" y="8685213"/>
+            <a:ext cx="2971800" cy="458787"/>
+          </a:xfrm>
+          <a:prstGeom prst="rect">
+            <a:avLst/>
+          </a:prstGeom>
+        </p:spPr>
+        <p:txBody>
+          <a:bodyPr vert="horz" lIns="91440" tIns="45720" rIns="91440" bIns="45720" rtlCol="0" anchor="b"/>
+          <a:lstStyle>
+            <a:lvl1pPr algn="l">
+              <a:defRPr sz="1200"/>
+            </a:lvl1pPr>
+          </a:lstStyle>
+          <a:p>
+            <a:endParaRPr lang="en-US"/>
+          </a:p>
+        </p:txBody>
+      </p:sp>
+      <p:sp>
+        <p:nvSpPr>
+          <p:cNvPr id="7" name="Slide Number Placeholder 6"/>
+          <p:cNvSpPr>
+            <a:spLocks noGrp="1"/>
+          </p:cNvSpPr>
+          <p:nvPr>
+            <p:ph type="sldNum" sz="quarter" idx="5"/>
+          </p:nvPr>
+        </p:nvSpPr>
+        <p:spPr>
+          <a:xfrm>
+            <a:off x="3884613" y="8685213"/>
+            <a:ext cx="2971800" cy="458787"/>
+          </a:xfrm>
+          <a:prstGeom prst="rect">
+            <a:avLst/>
+          </a:prstGeom>
+        </p:spPr>
+        <p:txBody>
+          <a:bodyPr vert="horz" lIns="91440" tIns="45720" rIns="91440" bIns="45720" rtlCol="0" anchor="b"/>
+          <a:lstStyle>
+            <a:lvl1pPr algn="r">
+              <a:defRPr sz="1200"/>
+            </a:lvl1pPr>
+          </a:lstStyle>
+          <a:p>
+            <a:fld id="{7F832BAC-4FBF-4007-850E-F78D615EBD2D}" type="slidenum">
+              <a:rPr lang="en-US" smtClean="0"/>
+              <a:t>‹#›</a:t>
+            </a:fld>
+            <a:endParaRPr lang="en-US"/>
+          </a:p>
+        </p:txBody>
+      </p:sp>
+    </p:spTree>
+    <p:extLst>
+      <p:ext uri="{BB962C8B-B14F-4D97-AF65-F5344CB8AC3E}">
+        <p14:creationId xmlns:p14="http://schemas.microsoft.com/office/powerpoint/2010/main" val="1231982414"/>
+      </p:ext>
+    </p:extLst>
+  </p:cSld>
+  <p:clrMap bg1="lt1" tx1="dk1" bg2="lt2" tx2="dk2" accent1="accent1" accent2="accent2" accent3="accent3" accent4="accent4" accent5="accent5" accent6="accent6" hlink="hlink" folHlink="folHlink"/>
+  <p:notesStyle>
+    <a:lvl1pPr marL="0" algn="l" defTabSz="914400" rtl="0" eaLnBrk="1" latinLnBrk="0" hangingPunct="1">
+      <a:defRPr sz="1200" kern="1200">
+        <a:solidFill>
+          <a:schemeClr val="tx1"/>
+        </a:solidFill>
+        <a:latin typeface="+mn-lt"/>
+        <a:ea typeface="+mn-ea"/>
+        <a:cs typeface="+mn-cs"/>
+      </a:defRPr>
+    </a:lvl1pPr>
+    <a:lvl2pPr marL="457200" algn="l" defTabSz="914400" rtl="0" eaLnBrk="1" latinLnBrk="0" hangingPunct="1">
+      <a:defRPr sz="1200" kern="1200">
+        <a:solidFill>
+          <a:schemeClr val="tx1"/>
+        </a:solidFill>
+        <a:latin typeface="+mn-lt"/>
+        <a:ea typeface="+mn-ea"/>
+        <a:cs typeface="+mn-cs"/>
+      </a:defRPr>
+    </a:lvl2pPr>
+    <a:lvl3pPr marL="914400" algn="l" defTabSz="914400" rtl="0" eaLnBrk="1" latinLnBrk="0" hangingPunct="1">
+      <a:defRPr sz="1200" kern="1200">
+        <a:solidFill>
+          <a:schemeClr val="tx1"/>
+        </a:solidFill>
+        <a:latin typeface="+mn-lt"/>
+        <a:ea typeface="+mn-ea"/>
+        <a:cs typeface="+mn-cs"/>
+      </a:defRPr>
+    </a:lvl3pPr>
+    <a:lvl4pPr marL="1371600" algn="l" defTabSz="914400" rtl="0" eaLnBrk="1" latinLnBrk="0" hangingPunct="1">
+      <a:defRPr sz="1200" kern="1200">
+        <a:solidFill>
+          <a:schemeClr val="tx1"/>
+        </a:solidFill>
+        <a:latin typeface="+mn-lt"/>
+        <a:ea typeface="+mn-ea"/>
+        <a:cs typeface="+mn-cs"/>
+      </a:defRPr>
+    </a:lvl4pPr>
+    <a:lvl5pPr marL="1828800" algn="l" defTabSz="914400" rtl="0" eaLnBrk="1" latinLnBrk="0" hangingPunct="1">
+      <a:defRPr sz="1200" kern="1200">
+        <a:solidFill>
+          <a:schemeClr val="tx1"/>
+        </a:solidFill>
+        <a:latin typeface="+mn-lt"/>
+        <a:ea typeface="+mn-ea"/>
+        <a:cs typeface="+mn-cs"/>
+      </a:defRPr>
+    </a:lvl5pPr>
+    <a:lvl6pPr marL="2286000" algn="l" defTabSz="914400" rtl="0" eaLnBrk="1" latinLnBrk="0" hangingPunct="1">
+      <a:defRPr sz="1200" kern="1200">
+        <a:solidFill>
+          <a:schemeClr val="tx1"/>
+        </a:solidFill>
+        <a:latin typeface="+mn-lt"/>
+        <a:ea typeface="+mn-ea"/>
+        <a:cs typeface="+mn-cs"/>
+      </a:defRPr>
+    </a:lvl6pPr>
+    <a:lvl7pPr marL="2743200" algn="l" defTabSz="914400" rtl="0" eaLnBrk="1" latinLnBrk="0" hangingPunct="1">
+      <a:defRPr sz="1200" kern="1200">
+        <a:solidFill>
+          <a:schemeClr val="tx1"/>
+        </a:solidFill>
+        <a:latin typeface="+mn-lt"/>
+        <a:ea typeface="+mn-ea"/>
+        <a:cs typeface="+mn-cs"/>
+      </a:defRPr>
+    </a:lvl7pPr>
+    <a:lvl8pPr marL="3200400" algn="l" defTabSz="914400" rtl="0" eaLnBrk="1" latinLnBrk="0" hangingPunct="1">
+      <a:defRPr sz="1200" kern="1200">
+        <a:solidFill>
+          <a:schemeClr val="tx1"/>
+        </a:solidFill>
+        <a:latin typeface="+mn-lt"/>
+        <a:ea typeface="+mn-ea"/>
+        <a:cs typeface="+mn-cs"/>
+      </a:defRPr>
+    </a:lvl8pPr>
+    <a:lvl9pPr marL="3657600" algn="l" defTabSz="914400" rtl="0" eaLnBrk="1" latinLnBrk="0" hangingPunct="1">
+      <a:defRPr sz="1200" kern="1200">
+        <a:solidFill>
+          <a:schemeClr val="tx1"/>
+        </a:solidFill>
+        <a:latin typeface="+mn-lt"/>
+        <a:ea typeface="+mn-ea"/>
+        <a:cs typeface="+mn-cs"/>
+      </a:defRPr>
+    </a:lvl9pPr>
+  </p:notesStyle>
+</p:notesMaster>
+</file>
+
+<file path=ppt/notesSlides/notesSlide1.xml><?xml version="1.0" encoding="utf-8"?>
+<p:notes xmlns:a="http://schemas.openxmlformats.org/drawingml/2006/main" xmlns:r="http://schemas.openxmlformats.org/officeDocument/2006/relationships" xmlns:p="http://schemas.openxmlformats.org/presentationml/2006/main">
+  <p:cSld>
+    <p:spTree>
+      <p:nvGrpSpPr>
+        <p:cNvPr id="1" name=""/>
+        <p:cNvGrpSpPr/>
+        <p:nvPr/>
+      </p:nvGrpSpPr>
+      <p:grpSpPr>
+        <a:xfrm>
+          <a:off x="0" y="0"/>
+          <a:ext cx="0" cy="0"/>
+          <a:chOff x="0" y="0"/>
+          <a:chExt cx="0" cy="0"/>
+        </a:xfrm>
+      </p:grpSpPr>
+      <p:sp>
+        <p:nvSpPr>
+          <p:cNvPr id="2" name="Slide Image Placeholder 1"/>
+          <p:cNvSpPr>
+            <a:spLocks noGrp="1" noRot="1" noChangeAspect="1"/>
+          </p:cNvSpPr>
+          <p:nvPr>
+            <p:ph type="sldImg"/>
+          </p:nvPr>
+        </p:nvSpPr>
+        <p:spPr/>
+      </p:sp>
+      <p:sp>
+        <p:nvSpPr>
+          <p:cNvPr id="3" name="Notes Placeholder 2"/>
+          <p:cNvSpPr>
+            <a:spLocks noGrp="1"/>
+          </p:cNvSpPr>
+          <p:nvPr>
+            <p:ph type="body" idx="1"/>
+          </p:nvPr>
+        </p:nvSpPr>
+        <p:spPr/>
+        <p:txBody>
+          <a:bodyPr/>
+          <a:lstStyle/>
+          <a:p>
+            <a:r>
+              <a:rPr lang="en-US" dirty="0"/>
+              <a:t>&lt;Sade&gt;</a:t>
+            </a:r>
+          </a:p>
+          <a:p>
+            <a:r>
+              <a:rPr lang="en-US" dirty="0"/>
+              <a:t>CONCEPT:</a:t>
+            </a:r>
+          </a:p>
+          <a:p>
+            <a:pPr lvl="1"/>
+            <a:r>
+              <a:rPr lang="en-US" dirty="0"/>
+              <a:t>- Project provides one-stop platform allowing users to research and compare electronics and tech products across an array of sources</a:t>
+            </a:r>
+          </a:p>
+          <a:p>
+            <a:pPr lvl="1"/>
+            <a:r>
+              <a:rPr lang="en-US" dirty="0"/>
+              <a:t>- Users get aggregated product searches to generate ratings and reviews along with trending news and social media mentions</a:t>
+            </a:r>
+          </a:p>
+          <a:p>
+            <a:r>
+              <a:rPr lang="en-US" dirty="0"/>
+              <a:t>DEVELOPMENT:</a:t>
+            </a:r>
+          </a:p>
+          <a:p>
+            <a:pPr lvl="1"/>
+            <a:r>
+              <a:rPr lang="en-US" i="1" dirty="0"/>
+              <a:t>- “Simplify your searches while raising your results”</a:t>
+            </a:r>
+          </a:p>
+          <a:p>
+            <a:pPr lvl="1"/>
+            <a:r>
+              <a:rPr lang="en-US" dirty="0"/>
+              <a:t>- </a:t>
+            </a:r>
+            <a:r>
+              <a:rPr lang="en-US" dirty="0" err="1"/>
+              <a:t>techGine</a:t>
+            </a:r>
+            <a:r>
+              <a:rPr lang="en-US" dirty="0"/>
+              <a:t> assists the user in simplifying and reducing the time needed to research a product yet still returning reliable results. Social trends and media news are also integrated into the product search.</a:t>
+            </a:r>
+          </a:p>
+          <a:p>
+            <a:endParaRPr lang="en-US" dirty="0"/>
+          </a:p>
+        </p:txBody>
+      </p:sp>
+      <p:sp>
+        <p:nvSpPr>
+          <p:cNvPr id="4" name="Slide Number Placeholder 3"/>
+          <p:cNvSpPr>
+            <a:spLocks noGrp="1"/>
+          </p:cNvSpPr>
+          <p:nvPr>
+            <p:ph type="sldNum" sz="quarter" idx="10"/>
+          </p:nvPr>
+        </p:nvSpPr>
+        <p:spPr/>
+        <p:txBody>
+          <a:bodyPr/>
+          <a:lstStyle/>
+          <a:p>
+            <a:fld id="{7F832BAC-4FBF-4007-850E-F78D615EBD2D}" type="slidenum">
+              <a:rPr lang="en-US" smtClean="0"/>
+              <a:t>3</a:t>
+            </a:fld>
+            <a:endParaRPr lang="en-US"/>
+          </a:p>
+        </p:txBody>
+      </p:sp>
+    </p:spTree>
+    <p:extLst>
+      <p:ext uri="{BB962C8B-B14F-4D97-AF65-F5344CB8AC3E}">
+        <p14:creationId xmlns:p14="http://schemas.microsoft.com/office/powerpoint/2010/main" val="196831244"/>
+      </p:ext>
+    </p:extLst>
+  </p:cSld>
+  <p:clrMapOvr>
+    <a:masterClrMapping/>
+  </p:clrMapOvr>
+</p:notes>
+</file>
+
+<file path=ppt/notesSlides/notesSlide2.xml><?xml version="1.0" encoding="utf-8"?>
+<p:notes xmlns:a="http://schemas.openxmlformats.org/drawingml/2006/main" xmlns:r="http://schemas.openxmlformats.org/officeDocument/2006/relationships" xmlns:p="http://schemas.openxmlformats.org/presentationml/2006/main">
+  <p:cSld>
+    <p:spTree>
+      <p:nvGrpSpPr>
+        <p:cNvPr id="1" name=""/>
+        <p:cNvGrpSpPr/>
+        <p:nvPr/>
+      </p:nvGrpSpPr>
+      <p:grpSpPr>
+        <a:xfrm>
+          <a:off x="0" y="0"/>
+          <a:ext cx="0" cy="0"/>
+          <a:chOff x="0" y="0"/>
+          <a:chExt cx="0" cy="0"/>
+        </a:xfrm>
+      </p:grpSpPr>
+      <p:sp>
+        <p:nvSpPr>
+          <p:cNvPr id="2" name="Slide Image Placeholder 1"/>
+          <p:cNvSpPr>
+            <a:spLocks noGrp="1" noRot="1" noChangeAspect="1"/>
+          </p:cNvSpPr>
+          <p:nvPr>
+            <p:ph type="sldImg"/>
+          </p:nvPr>
+        </p:nvSpPr>
+        <p:spPr/>
+      </p:sp>
+      <p:sp>
+        <p:nvSpPr>
+          <p:cNvPr id="3" name="Notes Placeholder 2"/>
+          <p:cNvSpPr>
+            <a:spLocks noGrp="1"/>
+          </p:cNvSpPr>
+          <p:nvPr>
+            <p:ph type="body" idx="1"/>
+          </p:nvPr>
+        </p:nvSpPr>
+        <p:spPr/>
+        <p:txBody>
+          <a:bodyPr/>
+          <a:lstStyle/>
+          <a:p>
+            <a:r>
+              <a:rPr lang="en-US" dirty="0"/>
+              <a:t>&lt;Jenn&gt;</a:t>
+            </a:r>
+          </a:p>
+        </p:txBody>
+      </p:sp>
+      <p:sp>
+        <p:nvSpPr>
+          <p:cNvPr id="4" name="Slide Number Placeholder 3"/>
+          <p:cNvSpPr>
+            <a:spLocks noGrp="1"/>
+          </p:cNvSpPr>
+          <p:nvPr>
+            <p:ph type="sldNum" sz="quarter" idx="10"/>
+          </p:nvPr>
+        </p:nvSpPr>
+        <p:spPr/>
+        <p:txBody>
+          <a:bodyPr/>
+          <a:lstStyle/>
+          <a:p>
+            <a:fld id="{7F832BAC-4FBF-4007-850E-F78D615EBD2D}" type="slidenum">
+              <a:rPr lang="en-US" smtClean="0"/>
+              <a:t>4</a:t>
+            </a:fld>
+            <a:endParaRPr lang="en-US"/>
+          </a:p>
+        </p:txBody>
+      </p:sp>
+    </p:spTree>
+    <p:extLst>
+      <p:ext uri="{BB962C8B-B14F-4D97-AF65-F5344CB8AC3E}">
+        <p14:creationId xmlns:p14="http://schemas.microsoft.com/office/powerpoint/2010/main" val="1470705446"/>
+      </p:ext>
+    </p:extLst>
+  </p:cSld>
+  <p:clrMapOvr>
+    <a:masterClrMapping/>
+  </p:clrMapOvr>
+</p:notes>
+</file>
+
+<file path=ppt/notesSlides/notesSlide3.xml><?xml version="1.0" encoding="utf-8"?>
+<p:notes xmlns:a="http://schemas.openxmlformats.org/drawingml/2006/main" xmlns:r="http://schemas.openxmlformats.org/officeDocument/2006/relationships" xmlns:p="http://schemas.openxmlformats.org/presentationml/2006/main">
+  <p:cSld>
+    <p:spTree>
+      <p:nvGrpSpPr>
+        <p:cNvPr id="1" name=""/>
+        <p:cNvGrpSpPr/>
+        <p:nvPr/>
+      </p:nvGrpSpPr>
+      <p:grpSpPr>
+        <a:xfrm>
+          <a:off x="0" y="0"/>
+          <a:ext cx="0" cy="0"/>
+          <a:chOff x="0" y="0"/>
+          <a:chExt cx="0" cy="0"/>
+        </a:xfrm>
+      </p:grpSpPr>
+      <p:sp>
+        <p:nvSpPr>
+          <p:cNvPr id="2" name="Slide Image Placeholder 1"/>
+          <p:cNvSpPr>
+            <a:spLocks noGrp="1" noRot="1" noChangeAspect="1"/>
+          </p:cNvSpPr>
+          <p:nvPr>
+            <p:ph type="sldImg"/>
+          </p:nvPr>
+        </p:nvSpPr>
+        <p:spPr/>
+      </p:sp>
+      <p:sp>
+        <p:nvSpPr>
+          <p:cNvPr id="3" name="Notes Placeholder 2"/>
+          <p:cNvSpPr>
+            <a:spLocks noGrp="1"/>
+          </p:cNvSpPr>
+          <p:nvPr>
+            <p:ph type="body" idx="1"/>
+          </p:nvPr>
+        </p:nvSpPr>
+        <p:spPr/>
+        <p:txBody>
+          <a:bodyPr/>
+          <a:lstStyle/>
+          <a:p>
+            <a:r>
+              <a:rPr lang="en-US" dirty="0"/>
+              <a:t>&lt;Nick&gt;</a:t>
+            </a:r>
+          </a:p>
+        </p:txBody>
+      </p:sp>
+      <p:sp>
+        <p:nvSpPr>
+          <p:cNvPr id="4" name="Slide Number Placeholder 3"/>
+          <p:cNvSpPr>
+            <a:spLocks noGrp="1"/>
+          </p:cNvSpPr>
+          <p:nvPr>
+            <p:ph type="sldNum" sz="quarter" idx="10"/>
+          </p:nvPr>
+        </p:nvSpPr>
+        <p:spPr/>
+        <p:txBody>
+          <a:bodyPr/>
+          <a:lstStyle/>
+          <a:p>
+            <a:fld id="{7F832BAC-4FBF-4007-850E-F78D615EBD2D}" type="slidenum">
+              <a:rPr lang="en-US" smtClean="0"/>
+              <a:t>5</a:t>
+            </a:fld>
+            <a:endParaRPr lang="en-US"/>
+          </a:p>
+        </p:txBody>
+      </p:sp>
+    </p:spTree>
+    <p:extLst>
+      <p:ext uri="{BB962C8B-B14F-4D97-AF65-F5344CB8AC3E}">
+        <p14:creationId xmlns:p14="http://schemas.microsoft.com/office/powerpoint/2010/main" val="563306223"/>
+      </p:ext>
+    </p:extLst>
+  </p:cSld>
+  <p:clrMapOvr>
+    <a:masterClrMapping/>
+  </p:clrMapOvr>
+</p:notes>
+</file>
+
+<file path=ppt/notesSlides/notesSlide4.xml><?xml version="1.0" encoding="utf-8"?>
+<p:notes xmlns:a="http://schemas.openxmlformats.org/drawingml/2006/main" xmlns:r="http://schemas.openxmlformats.org/officeDocument/2006/relationships" xmlns:p="http://schemas.openxmlformats.org/presentationml/2006/main">
+  <p:cSld>
+    <p:spTree>
+      <p:nvGrpSpPr>
+        <p:cNvPr id="1" name=""/>
+        <p:cNvGrpSpPr/>
+        <p:nvPr/>
+      </p:nvGrpSpPr>
+      <p:grpSpPr>
+        <a:xfrm>
+          <a:off x="0" y="0"/>
+          <a:ext cx="0" cy="0"/>
+          <a:chOff x="0" y="0"/>
+          <a:chExt cx="0" cy="0"/>
+        </a:xfrm>
+      </p:grpSpPr>
+      <p:sp>
+        <p:nvSpPr>
+          <p:cNvPr id="2" name="Slide Image Placeholder 1"/>
+          <p:cNvSpPr>
+            <a:spLocks noGrp="1" noRot="1" noChangeAspect="1"/>
+          </p:cNvSpPr>
+          <p:nvPr>
+            <p:ph type="sldImg"/>
+          </p:nvPr>
+        </p:nvSpPr>
+        <p:spPr/>
+      </p:sp>
+      <p:sp>
+        <p:nvSpPr>
+          <p:cNvPr id="3" name="Notes Placeholder 2"/>
+          <p:cNvSpPr>
+            <a:spLocks noGrp="1"/>
+          </p:cNvSpPr>
+          <p:nvPr>
+            <p:ph type="body" idx="1"/>
+          </p:nvPr>
+        </p:nvSpPr>
+        <p:spPr/>
+        <p:txBody>
+          <a:bodyPr/>
+          <a:lstStyle/>
+          <a:p>
+            <a:r>
+              <a:rPr lang="en-US" dirty="0"/>
+              <a:t>&lt;Mark&gt;</a:t>
+            </a:r>
+          </a:p>
+        </p:txBody>
+      </p:sp>
+      <p:sp>
+        <p:nvSpPr>
+          <p:cNvPr id="4" name="Slide Number Placeholder 3"/>
+          <p:cNvSpPr>
+            <a:spLocks noGrp="1"/>
+          </p:cNvSpPr>
+          <p:nvPr>
+            <p:ph type="sldNum" sz="quarter" idx="10"/>
+          </p:nvPr>
+        </p:nvSpPr>
+        <p:spPr/>
+        <p:txBody>
+          <a:bodyPr/>
+          <a:lstStyle/>
+          <a:p>
+            <a:fld id="{7F832BAC-4FBF-4007-850E-F78D615EBD2D}" type="slidenum">
+              <a:rPr lang="en-US" smtClean="0"/>
+              <a:t>6</a:t>
+            </a:fld>
+            <a:endParaRPr lang="en-US"/>
+          </a:p>
+        </p:txBody>
+      </p:sp>
+    </p:spTree>
+    <p:extLst>
+      <p:ext uri="{BB962C8B-B14F-4D97-AF65-F5344CB8AC3E}">
+        <p14:creationId xmlns:p14="http://schemas.microsoft.com/office/powerpoint/2010/main" val="4070149304"/>
+      </p:ext>
+    </p:extLst>
+  </p:cSld>
+  <p:clrMapOvr>
+    <a:masterClrMapping/>
+  </p:clrMapOvr>
+</p:notes>
+</file>
+
+<file path=ppt/notesSlides/notesSlide5.xml><?xml version="1.0" encoding="utf-8"?>
+<p:notes xmlns:a="http://schemas.openxmlformats.org/drawingml/2006/main" xmlns:r="http://schemas.openxmlformats.org/officeDocument/2006/relationships" xmlns:p="http://schemas.openxmlformats.org/presentationml/2006/main">
+  <p:cSld>
+    <p:spTree>
+      <p:nvGrpSpPr>
+        <p:cNvPr id="1" name=""/>
+        <p:cNvGrpSpPr/>
+        <p:nvPr/>
+      </p:nvGrpSpPr>
+      <p:grpSpPr>
+        <a:xfrm>
+          <a:off x="0" y="0"/>
+          <a:ext cx="0" cy="0"/>
+          <a:chOff x="0" y="0"/>
+          <a:chExt cx="0" cy="0"/>
+        </a:xfrm>
+      </p:grpSpPr>
+      <p:sp>
+        <p:nvSpPr>
+          <p:cNvPr id="2" name="Slide Image Placeholder 1"/>
+          <p:cNvSpPr>
+            <a:spLocks noGrp="1" noRot="1" noChangeAspect="1"/>
+          </p:cNvSpPr>
+          <p:nvPr>
+            <p:ph type="sldImg"/>
+          </p:nvPr>
+        </p:nvSpPr>
+        <p:spPr/>
+      </p:sp>
+      <p:sp>
+        <p:nvSpPr>
+          <p:cNvPr id="3" name="Notes Placeholder 2"/>
+          <p:cNvSpPr>
+            <a:spLocks noGrp="1"/>
+          </p:cNvSpPr>
+          <p:nvPr>
+            <p:ph type="body" idx="1"/>
+          </p:nvPr>
+        </p:nvSpPr>
+        <p:spPr/>
+        <p:txBody>
+          <a:bodyPr/>
+          <a:lstStyle/>
+          <a:p>
+            <a:r>
+              <a:rPr lang="en-US" dirty="0"/>
+              <a:t>&lt;Alize&gt;</a:t>
+            </a:r>
+          </a:p>
+        </p:txBody>
+      </p:sp>
+      <p:sp>
+        <p:nvSpPr>
+          <p:cNvPr id="4" name="Slide Number Placeholder 3"/>
+          <p:cNvSpPr>
+            <a:spLocks noGrp="1"/>
+          </p:cNvSpPr>
+          <p:nvPr>
+            <p:ph type="sldNum" sz="quarter" idx="10"/>
+          </p:nvPr>
+        </p:nvSpPr>
+        <p:spPr/>
+        <p:txBody>
+          <a:bodyPr/>
+          <a:lstStyle/>
+          <a:p>
+            <a:fld id="{7F832BAC-4FBF-4007-850E-F78D615EBD2D}" type="slidenum">
+              <a:rPr lang="en-US" smtClean="0"/>
+              <a:t>7</a:t>
+            </a:fld>
+            <a:endParaRPr lang="en-US"/>
+          </a:p>
+        </p:txBody>
+      </p:sp>
+    </p:spTree>
+    <p:extLst>
+      <p:ext uri="{BB962C8B-B14F-4D97-AF65-F5344CB8AC3E}">
+        <p14:creationId xmlns:p14="http://schemas.microsoft.com/office/powerpoint/2010/main" val="966109738"/>
+      </p:ext>
+    </p:extLst>
+  </p:cSld>
+  <p:clrMapOvr>
+    <a:masterClrMapping/>
+  </p:clrMapOvr>
+</p:notes>
+</file>
+
 <file path=ppt/slideLayouts/slideLayout1.xml><?xml version="1.0" encoding="utf-8"?>
 <p:sldLayout xmlns:a="http://schemas.openxmlformats.org/drawingml/2006/main" xmlns:r="http://schemas.openxmlformats.org/officeDocument/2006/relationships" xmlns:p="http://schemas.openxmlformats.org/presentationml/2006/main" type="title" preserve="1">
   <p:cSld name="Title Slide">
@@ -308,7 +1146,7 @@
           <a:p>
             <a:fld id="{4AAD347D-5ACD-4C99-B74B-A9C85AD731AF}" type="datetimeFigureOut">
               <a:rPr lang="en-US" dirty="0"/>
-              <a:t>11/10/2017</a:t>
+              <a:t>11/13/2017</a:t>
             </a:fld>
             <a:endParaRPr lang="en-US" dirty="0"/>
           </a:p>
@@ -584,7 +1422,7 @@
           <a:p>
             <a:fld id="{4509A250-FF31-4206-8172-F9D3106AACB1}" type="datetimeFigureOut">
               <a:rPr lang="en-US" dirty="0"/>
-              <a:t>11/10/2017</a:t>
+              <a:t>11/13/2017</a:t>
             </a:fld>
             <a:endParaRPr lang="en-US" dirty="0"/>
           </a:p>
@@ -773,7 +1611,7 @@
           <a:p>
             <a:fld id="{4509A250-FF31-4206-8172-F9D3106AACB1}" type="datetimeFigureOut">
               <a:rPr lang="en-US" dirty="0"/>
-              <a:t>11/10/2017</a:t>
+              <a:t>11/13/2017</a:t>
             </a:fld>
             <a:endParaRPr lang="en-US" dirty="0"/>
           </a:p>
@@ -1041,7 +1879,7 @@
           <a:p>
             <a:fld id="{4509A250-FF31-4206-8172-F9D3106AACB1}" type="datetimeFigureOut">
               <a:rPr lang="en-US" dirty="0"/>
-              <a:t>11/10/2017</a:t>
+              <a:t>11/13/2017</a:t>
             </a:fld>
             <a:endParaRPr lang="en-US" dirty="0"/>
           </a:p>
@@ -1377,7 +2215,7 @@
           <a:p>
             <a:fld id="{4509A250-FF31-4206-8172-F9D3106AACB1}" type="datetimeFigureOut">
               <a:rPr lang="en-US" dirty="0"/>
-              <a:t>11/10/2017</a:t>
+              <a:t>11/13/2017</a:t>
             </a:fld>
             <a:endParaRPr lang="en-US" dirty="0"/>
           </a:p>
@@ -1995,7 +2833,7 @@
           <a:p>
             <a:fld id="{4509A250-FF31-4206-8172-F9D3106AACB1}" type="datetimeFigureOut">
               <a:rPr lang="en-US" dirty="0"/>
-              <a:t>11/10/2017</a:t>
+              <a:t>11/13/2017</a:t>
             </a:fld>
             <a:endParaRPr lang="en-US" dirty="0"/>
           </a:p>
@@ -2850,7 +3688,7 @@
           <a:p>
             <a:fld id="{4509A250-FF31-4206-8172-F9D3106AACB1}" type="datetimeFigureOut">
               <a:rPr lang="en-US" dirty="0"/>
-              <a:t>11/10/2017</a:t>
+              <a:t>11/13/2017</a:t>
             </a:fld>
             <a:endParaRPr lang="en-US" dirty="0"/>
           </a:p>
@@ -3015,7 +3853,7 @@
           <a:p>
             <a:fld id="{4509A250-FF31-4206-8172-F9D3106AACB1}" type="datetimeFigureOut">
               <a:rPr lang="en-US" dirty="0"/>
-              <a:t>11/10/2017</a:t>
+              <a:t>11/13/2017</a:t>
             </a:fld>
             <a:endParaRPr lang="en-US" dirty="0"/>
           </a:p>
@@ -3190,7 +4028,7 @@
           <a:p>
             <a:fld id="{4509A250-FF31-4206-8172-F9D3106AACB1}" type="datetimeFigureOut">
               <a:rPr lang="en-US" dirty="0"/>
-              <a:t>11/10/2017</a:t>
+              <a:t>11/13/2017</a:t>
             </a:fld>
             <a:endParaRPr lang="en-US" dirty="0"/>
           </a:p>
@@ -3355,7 +4193,7 @@
           <a:p>
             <a:fld id="{4509A250-FF31-4206-8172-F9D3106AACB1}" type="datetimeFigureOut">
               <a:rPr lang="en-US" dirty="0"/>
-              <a:t>11/10/2017</a:t>
+              <a:t>11/13/2017</a:t>
             </a:fld>
             <a:endParaRPr lang="en-US" dirty="0"/>
           </a:p>
@@ -3597,7 +4435,7 @@
           <a:p>
             <a:fld id="{9796027F-7875-4030-9381-8BD8C4F21935}" type="datetimeFigureOut">
               <a:rPr lang="en-US" dirty="0"/>
-              <a:t>11/10/2017</a:t>
+              <a:t>11/13/2017</a:t>
             </a:fld>
             <a:endParaRPr lang="en-US" dirty="0"/>
           </a:p>
@@ -3884,7 +4722,7 @@
           <a:p>
             <a:fld id="{9796027F-7875-4030-9381-8BD8C4F21935}" type="datetimeFigureOut">
               <a:rPr lang="en-US" dirty="0"/>
-              <a:t>11/10/2017</a:t>
+              <a:t>11/13/2017</a:t>
             </a:fld>
             <a:endParaRPr lang="en-US" dirty="0"/>
           </a:p>
@@ -4323,7 +5161,7 @@
           <a:p>
             <a:fld id="{9796027F-7875-4030-9381-8BD8C4F21935}" type="datetimeFigureOut">
               <a:rPr lang="en-US" dirty="0"/>
-              <a:t>11/10/2017</a:t>
+              <a:t>11/13/2017</a:t>
             </a:fld>
             <a:endParaRPr lang="en-US" dirty="0"/>
           </a:p>
@@ -4436,7 +5274,7 @@
           <a:p>
             <a:fld id="{4509A250-FF31-4206-8172-F9D3106AACB1}" type="datetimeFigureOut">
               <a:rPr lang="en-US" dirty="0"/>
-              <a:t>11/10/2017</a:t>
+              <a:t>11/13/2017</a:t>
             </a:fld>
             <a:endParaRPr lang="en-US" dirty="0"/>
           </a:p>
@@ -4526,7 +5364,7 @@
           <a:p>
             <a:fld id="{4509A250-FF31-4206-8172-F9D3106AACB1}" type="datetimeFigureOut">
               <a:rPr lang="en-US" dirty="0"/>
-              <a:t>11/10/2017</a:t>
+              <a:t>11/13/2017</a:t>
             </a:fld>
             <a:endParaRPr lang="en-US" dirty="0"/>
           </a:p>
@@ -4800,7 +5638,7 @@
           <a:p>
             <a:fld id="{4509A250-FF31-4206-8172-F9D3106AACB1}" type="datetimeFigureOut">
               <a:rPr lang="en-US" dirty="0"/>
-              <a:t>11/10/2017</a:t>
+              <a:t>11/13/2017</a:t>
             </a:fld>
             <a:endParaRPr lang="en-US" dirty="0"/>
           </a:p>
@@ -5070,7 +5908,7 @@
           <a:p>
             <a:fld id="{4509A250-FF31-4206-8172-F9D3106AACB1}" type="datetimeFigureOut">
               <a:rPr lang="en-US" dirty="0"/>
-              <a:t>11/10/2017</a:t>
+              <a:t>11/13/2017</a:t>
             </a:fld>
             <a:endParaRPr lang="en-US" dirty="0"/>
           </a:p>
@@ -5494,7 +6332,7 @@
           <a:p>
             <a:fld id="{4AAD347D-5ACD-4C99-B74B-A9C85AD731AF}" type="datetimeFigureOut">
               <a:rPr lang="en-US" dirty="0"/>
-              <a:t>11/10/2017</a:t>
+              <a:t>11/13/2017</a:t>
             </a:fld>
             <a:endParaRPr lang="en-US" dirty="0"/>
           </a:p>
@@ -6034,7 +6872,12 @@
             <p:ph type="ctrTitle"/>
           </p:nvPr>
         </p:nvSpPr>
-        <p:spPr/>
+        <p:spPr>
+          <a:xfrm>
+            <a:off x="1654636" y="2197917"/>
+            <a:ext cx="6822975" cy="3095537"/>
+          </a:xfrm>
+        </p:spPr>
         <p:txBody>
           <a:bodyPr/>
           <a:lstStyle/>
@@ -6093,10 +6936,7 @@
           </a:bodyPr>
           <a:lstStyle/>
           <a:p>
-            <a:r>
-              <a:rPr lang="en-US" sz="2400" dirty="0"/>
-              <a:t>BROUGHT TO YOU BY:</a:t>
-            </a:r>
+            <a:endParaRPr lang="en-US" sz="2400" dirty="0"/>
           </a:p>
           <a:p>
             <a:r>
@@ -6107,7 +6947,7 @@
           <a:p>
             <a:r>
               <a:rPr lang="en-US" sz="1600" dirty="0"/>
-              <a:t>	|Sade Browne / Jenn Chu / Mark </a:t>
+              <a:t>	&lt; Sade Browne / Jenn Chu / Mark </a:t>
             </a:r>
             <a:r>
               <a:rPr lang="en-US" sz="1600" dirty="0" err="1"/>
@@ -6131,7 +6971,7 @@
             </a:r>
             <a:r>
               <a:rPr lang="en-US" sz="1600" dirty="0"/>
-              <a:t>|</a:t>
+              <a:t> &gt;</a:t>
             </a:r>
           </a:p>
           <a:p>
@@ -6196,7 +7036,7 @@
         </p:nvSpPr>
         <p:spPr>
           <a:xfrm>
-            <a:off x="2457062" y="3198167"/>
+            <a:off x="2985568" y="3575672"/>
             <a:ext cx="7879080" cy="461665"/>
           </a:xfrm>
           <a:prstGeom prst="rect">
@@ -6219,6 +7059,108 @@
           </a:p>
         </p:txBody>
       </p:sp>
+      <p:grpSp>
+        <p:nvGrpSpPr>
+          <p:cNvPr id="9" name="Group 8">
+            <a:extLst>
+              <a:ext uri="{FF2B5EF4-FFF2-40B4-BE49-F238E27FC236}">
+                <a16:creationId xmlns:a16="http://schemas.microsoft.com/office/drawing/2014/main" id="{FD31F743-F575-4A62-90AC-BB50F523D3A4}"/>
+              </a:ext>
+            </a:extLst>
+          </p:cNvPr>
+          <p:cNvGrpSpPr/>
+          <p:nvPr/>
+        </p:nvGrpSpPr>
+        <p:grpSpPr>
+          <a:xfrm>
+            <a:off x="0" y="411208"/>
+            <a:ext cx="6504990" cy="2147583"/>
+            <a:chOff x="1095436" y="109056"/>
+            <a:chExt cx="6504990" cy="2147583"/>
+          </a:xfrm>
+        </p:grpSpPr>
+        <p:sp>
+          <p:nvSpPr>
+            <p:cNvPr id="8" name="Rectangle 7">
+              <a:extLst>
+                <a:ext uri="{FF2B5EF4-FFF2-40B4-BE49-F238E27FC236}">
+                  <a16:creationId xmlns:a16="http://schemas.microsoft.com/office/drawing/2014/main" id="{244B0196-3F32-4BBB-B46F-E6364B0BF6F1}"/>
+                </a:ext>
+              </a:extLst>
+            </p:cNvPr>
+            <p:cNvSpPr/>
+            <p:nvPr/>
+          </p:nvSpPr>
+          <p:spPr>
+            <a:xfrm>
+              <a:off x="1095436" y="109056"/>
+              <a:ext cx="6504990" cy="2088859"/>
+            </a:xfrm>
+            <a:prstGeom prst="rect">
+              <a:avLst/>
+            </a:prstGeom>
+            <a:solidFill>
+              <a:schemeClr val="tx1"/>
+            </a:solidFill>
+            <a:ln>
+              <a:noFill/>
+            </a:ln>
+          </p:spPr>
+          <p:style>
+            <a:lnRef idx="2">
+              <a:schemeClr val="accent1">
+                <a:shade val="50000"/>
+              </a:schemeClr>
+            </a:lnRef>
+            <a:fillRef idx="1">
+              <a:schemeClr val="accent1"/>
+            </a:fillRef>
+            <a:effectRef idx="0">
+              <a:schemeClr val="accent1"/>
+            </a:effectRef>
+            <a:fontRef idx="minor">
+              <a:schemeClr val="lt1"/>
+            </a:fontRef>
+          </p:style>
+          <p:txBody>
+            <a:bodyPr rtlCol="0" anchor="ctr"/>
+            <a:lstStyle/>
+            <a:p>
+              <a:pPr algn="ctr"/>
+              <a:endParaRPr lang="en-US"/>
+            </a:p>
+          </p:txBody>
+        </p:sp>
+        <p:pic>
+          <p:nvPicPr>
+            <p:cNvPr id="7" name="Picture 6">
+              <a:extLst>
+                <a:ext uri="{FF2B5EF4-FFF2-40B4-BE49-F238E27FC236}">
+                  <a16:creationId xmlns:a16="http://schemas.microsoft.com/office/drawing/2014/main" id="{8192979A-7EDC-4FC9-B36F-A2D7079A913F}"/>
+                </a:ext>
+              </a:extLst>
+            </p:cNvPr>
+            <p:cNvPicPr>
+              <a:picLocks noChangeAspect="1"/>
+            </p:cNvPicPr>
+            <p:nvPr/>
+          </p:nvPicPr>
+          <p:blipFill rotWithShape="1">
+            <a:blip r:embed="rId2"/>
+            <a:srcRect l="41462" b="69541"/>
+            <a:stretch/>
+          </p:blipFill>
+          <p:spPr>
+            <a:xfrm>
+              <a:off x="1095436" y="167780"/>
+              <a:ext cx="6331360" cy="2088859"/>
+            </a:xfrm>
+            <a:prstGeom prst="rect">
+              <a:avLst/>
+            </a:prstGeom>
+          </p:spPr>
+        </p:pic>
+      </p:grpSp>
     </p:spTree>
     <p:extLst>
       <p:ext uri="{BB962C8B-B14F-4D97-AF65-F5344CB8AC3E}">
@@ -6309,31 +7251,31 @@
           <a:p>
             <a:r>
               <a:rPr lang="en-US" sz="2400" dirty="0"/>
-              <a:t>Product Scope</a:t>
+              <a:t>PRODUCT SCOPE</a:t>
             </a:r>
           </a:p>
           <a:p>
             <a:r>
               <a:rPr lang="en-US" sz="2400" dirty="0"/>
-              <a:t>Product Design</a:t>
+              <a:t>PRODUCT DESIGN</a:t>
             </a:r>
           </a:p>
           <a:p>
             <a:r>
               <a:rPr lang="en-US" sz="2400" dirty="0"/>
-              <a:t>Product Technologies</a:t>
+              <a:t>PRODUCT TECHNOLOGIES</a:t>
             </a:r>
           </a:p>
           <a:p>
             <a:r>
               <a:rPr lang="en-US" sz="2400" dirty="0"/>
-              <a:t>Product Improvements</a:t>
+              <a:t>PRODUCT IMPROVEMENT</a:t>
             </a:r>
           </a:p>
           <a:p>
             <a:r>
               <a:rPr lang="en-US" sz="2400" dirty="0"/>
-              <a:t>Product Demo</a:t>
+              <a:t>PRODUCT DEMO</a:t>
             </a:r>
           </a:p>
           <a:p>
@@ -6465,46 +7407,56 @@
           <a:lstStyle/>
           <a:p>
             <a:r>
-              <a:rPr lang="en-US" dirty="0"/>
+              <a:rPr lang="en-US" sz="2400" dirty="0"/>
               <a:t>CONCEPT:</a:t>
             </a:r>
           </a:p>
           <a:p>
             <a:pPr lvl="1"/>
             <a:r>
-              <a:rPr lang="en-US" dirty="0"/>
-              <a:t>Project provides one-stop platform allowing users to research and compare electronics and tech products across an array of sources</a:t>
+              <a:rPr lang="en-US" sz="2000" dirty="0"/>
+              <a:t>One-stop search platform</a:t>
             </a:r>
           </a:p>
           <a:p>
             <a:pPr lvl="1"/>
             <a:r>
-              <a:rPr lang="en-US" dirty="0"/>
-              <a:t>Users get aggregated product searches to generate ratings and reviews along with trending news and social media mentions</a:t>
-            </a:r>
-          </a:p>
-          <a:p>
-            <a:r>
-              <a:rPr lang="en-US" dirty="0"/>
+              <a:rPr lang="en-US" sz="2000" dirty="0"/>
+              <a:t>Output of aggregated product reviews and ratings</a:t>
+            </a:r>
+          </a:p>
+          <a:p>
+            <a:r>
+              <a:rPr lang="en-US" sz="2400" dirty="0"/>
               <a:t>DEVELOPMENT:</a:t>
             </a:r>
           </a:p>
           <a:p>
             <a:pPr lvl="1"/>
             <a:r>
-              <a:rPr lang="en-US" i="1" dirty="0"/>
+              <a:rPr lang="en-US" sz="2000" i="1" dirty="0"/>
               <a:t>“Simplify your searches while raising your results”</a:t>
             </a:r>
           </a:p>
           <a:p>
             <a:pPr lvl="1"/>
             <a:r>
-              <a:rPr lang="en-US" dirty="0" err="1"/>
-              <a:t>techGine</a:t>
-            </a:r>
-            <a:r>
-              <a:rPr lang="en-US" dirty="0"/>
-              <a:t> assists the user in simplifying and reducing the time needed to research a product yet still returning reliable results. Social trends and media news are also integrated into the product search.</a:t>
+              <a:rPr lang="en-US" sz="2000" dirty="0"/>
+              <a:t>Reduce search time</a:t>
+            </a:r>
+          </a:p>
+          <a:p>
+            <a:pPr lvl="1"/>
+            <a:r>
+              <a:rPr lang="en-US" sz="2000" dirty="0"/>
+              <a:t>Reliable results</a:t>
+            </a:r>
+          </a:p>
+          <a:p>
+            <a:pPr lvl="1"/>
+            <a:r>
+              <a:rPr lang="en-US" sz="2000" dirty="0"/>
+              <a:t>Media reviews integration</a:t>
             </a:r>
           </a:p>
           <a:p>
@@ -6615,38 +7567,38 @@
           </a:p>
         </p:txBody>
       </p:sp>
-      <p:sp>
-        <p:nvSpPr>
-          <p:cNvPr id="3" name="Content Placeholder 2">
+      <p:pic>
+        <p:nvPicPr>
+          <p:cNvPr id="5" name="Content Placeholder 4">
             <a:extLst>
               <a:ext uri="{FF2B5EF4-FFF2-40B4-BE49-F238E27FC236}">
-                <a16:creationId xmlns:a16="http://schemas.microsoft.com/office/drawing/2014/main" id="{55E9EAB3-2782-47BF-83E2-EBCEC00EEE3E}"/>
+                <a16:creationId xmlns:a16="http://schemas.microsoft.com/office/drawing/2014/main" id="{975EE2C3-2A82-4705-B1FF-1913156D37F5}"/>
               </a:ext>
             </a:extLst>
           </p:cNvPr>
-          <p:cNvSpPr>
-            <a:spLocks noGrp="1"/>
-          </p:cNvSpPr>
+          <p:cNvPicPr>
+            <a:picLocks noGrp="1" noChangeAspect="1"/>
+          </p:cNvPicPr>
           <p:nvPr>
             <p:ph idx="1"/>
           </p:nvPr>
-        </p:nvSpPr>
-        <p:spPr/>
-        <p:txBody>
-          <a:bodyPr/>
-          <a:lstStyle/>
-          <a:p>
-            <a:r>
-              <a:rPr lang="en-US" dirty="0"/>
-              <a:t>FLOWCHART</a:t>
-            </a:r>
-          </a:p>
-          <a:p>
-            <a:pPr lvl="1"/>
-            <a:endParaRPr lang="en-US" dirty="0"/>
-          </a:p>
-        </p:txBody>
-      </p:sp>
+        </p:nvPicPr>
+        <p:blipFill>
+          <a:blip r:embed="rId3"/>
+          <a:stretch>
+            <a:fillRect/>
+          </a:stretch>
+        </p:blipFill>
+        <p:spPr>
+          <a:xfrm>
+            <a:off x="5507148" y="0"/>
+            <a:ext cx="4730619" cy="6858000"/>
+          </a:xfrm>
+          <a:prstGeom prst="rect">
+            <a:avLst/>
+          </a:prstGeom>
+        </p:spPr>
+      </p:pic>
       <p:sp>
         <p:nvSpPr>
           <p:cNvPr id="4" name="TextBox 3">
@@ -6771,90 +7723,72 @@
           <a:lstStyle/>
           <a:p>
             <a:r>
-              <a:rPr lang="en-US" dirty="0"/>
+              <a:rPr lang="en-US" sz="2400" dirty="0"/>
               <a:t>User Input Capability</a:t>
             </a:r>
           </a:p>
           <a:p>
             <a:r>
-              <a:rPr lang="en-US" dirty="0"/>
+              <a:rPr lang="en-US" sz="2400" dirty="0"/>
               <a:t>Various APIs</a:t>
             </a:r>
           </a:p>
           <a:p>
             <a:pPr lvl="1"/>
             <a:r>
-              <a:rPr lang="en-US" dirty="0"/>
-              <a:t>Product Retailer: Best Buy and Walmart</a:t>
+              <a:rPr lang="en-US" sz="2000" dirty="0"/>
+              <a:t>Product Retailer: Walmart</a:t>
             </a:r>
           </a:p>
           <a:p>
             <a:pPr lvl="1"/>
             <a:r>
-              <a:rPr lang="en-US" dirty="0"/>
+              <a:rPr lang="en-US" sz="2000" dirty="0"/>
               <a:t>Data </a:t>
             </a:r>
             <a:r>
-              <a:rPr lang="en-US" dirty="0" err="1"/>
+              <a:rPr lang="en-US" sz="2000" dirty="0" err="1"/>
               <a:t>Extrator</a:t>
             </a:r>
             <a:r>
-              <a:rPr lang="en-US" dirty="0"/>
+              <a:rPr lang="en-US" sz="2000" dirty="0"/>
               <a:t>: </a:t>
             </a:r>
             <a:r>
-              <a:rPr lang="en-US" dirty="0" err="1"/>
+              <a:rPr lang="en-US" sz="2000" dirty="0" err="1"/>
               <a:t>Webhose</a:t>
             </a:r>
-            <a:endParaRPr lang="en-US" dirty="0"/>
+            <a:endParaRPr lang="en-US" sz="2000" dirty="0"/>
           </a:p>
           <a:p>
             <a:pPr lvl="1"/>
             <a:r>
-              <a:rPr lang="en-US" dirty="0"/>
-              <a:t>News Service: News</a:t>
-            </a:r>
-          </a:p>
-          <a:p>
-            <a:pPr lvl="1"/>
-            <a:r>
-              <a:rPr lang="en-US" dirty="0"/>
-              <a:t>Social Platform: </a:t>
-            </a:r>
-            <a:r>
-              <a:rPr lang="en-US" dirty="0" err="1"/>
-              <a:t>Youtube</a:t>
-            </a:r>
-            <a:r>
-              <a:rPr lang="en-US" dirty="0"/>
-              <a:t> and Twitter</a:t>
-            </a:r>
-          </a:p>
-          <a:p>
-            <a:r>
-              <a:rPr lang="en-US" dirty="0"/>
+              <a:rPr lang="en-US" sz="2000" dirty="0"/>
+              <a:t>Social Platform: YouTube</a:t>
+            </a:r>
+          </a:p>
+          <a:p>
+            <a:r>
+              <a:rPr lang="en-US" sz="2400" dirty="0"/>
               <a:t>jQuery JavaScript library</a:t>
             </a:r>
           </a:p>
           <a:p>
             <a:r>
-              <a:rPr lang="en-US" dirty="0"/>
+              <a:rPr lang="en-US" sz="2400" dirty="0"/>
               <a:t>AJAX client-side script</a:t>
             </a:r>
           </a:p>
           <a:p>
             <a:r>
-              <a:rPr lang="en-US" dirty="0"/>
+              <a:rPr lang="en-US" sz="2400" dirty="0"/>
               <a:t>Materialize CSS Framework</a:t>
             </a:r>
           </a:p>
           <a:p>
-            <a:r>
-              <a:rPr lang="en-US" dirty="0"/>
-              <a:t>New library? Technology?</a:t>
-            </a:r>
-          </a:p>
-          <a:p>
+            <a:pPr marL="0" indent="0">
+              <a:buNone/>
+            </a:pPr>
             <a:endParaRPr lang="en-US" dirty="0"/>
           </a:p>
         </p:txBody>
@@ -6983,55 +7917,62 @@
           <a:lstStyle/>
           <a:p>
             <a:r>
-              <a:rPr lang="en-US" dirty="0"/>
+              <a:rPr lang="en-US" sz="2400" dirty="0"/>
               <a:t>Obstacles</a:t>
             </a:r>
           </a:p>
           <a:p>
             <a:pPr lvl="1"/>
             <a:r>
-              <a:rPr lang="en-US" dirty="0"/>
+              <a:rPr lang="en-US" sz="2000" dirty="0"/>
               <a:t>API availability and usage</a:t>
             </a:r>
           </a:p>
           <a:p>
             <a:pPr lvl="1"/>
             <a:r>
-              <a:rPr lang="en-US" dirty="0"/>
+              <a:rPr lang="en-US" sz="2000" dirty="0"/>
+              <a:t>Identical product availability</a:t>
+            </a:r>
+          </a:p>
+          <a:p>
+            <a:pPr lvl="1"/>
+            <a:r>
+              <a:rPr lang="en-US" sz="2000" dirty="0"/>
               <a:t>Asynchronous programming</a:t>
             </a:r>
           </a:p>
           <a:p>
             <a:pPr lvl="1"/>
             <a:r>
-              <a:rPr lang="en-US" dirty="0"/>
+              <a:rPr lang="en-US" sz="2000" dirty="0"/>
               <a:t>Cross-origin resource sharing</a:t>
             </a:r>
           </a:p>
           <a:p>
             <a:r>
-              <a:rPr lang="en-US" dirty="0"/>
+              <a:rPr lang="en-US" sz="2400" dirty="0"/>
               <a:t>Improvements</a:t>
             </a:r>
           </a:p>
           <a:p>
             <a:pPr lvl="1"/>
             <a:r>
-              <a:rPr lang="en-US" dirty="0"/>
+              <a:rPr lang="en-US" sz="2000" dirty="0"/>
               <a:t>Wider range of aggregated ratings/reviews</a:t>
             </a:r>
           </a:p>
           <a:p>
             <a:pPr lvl="1"/>
             <a:r>
-              <a:rPr lang="en-US" dirty="0"/>
+              <a:rPr lang="en-US" sz="2000" dirty="0"/>
               <a:t>Code design methodology and implementation</a:t>
             </a:r>
           </a:p>
           <a:p>
             <a:pPr lvl="1"/>
             <a:r>
-              <a:rPr lang="en-US" dirty="0"/>
+              <a:rPr lang="en-US" sz="2000" dirty="0"/>
               <a:t>Real-time product trends on web media</a:t>
             </a:r>
           </a:p>
@@ -7147,36 +8088,38 @@
           </a:p>
         </p:txBody>
       </p:sp>
-      <p:sp>
-        <p:nvSpPr>
-          <p:cNvPr id="3" name="Content Placeholder 2">
+      <p:pic>
+        <p:nvPicPr>
+          <p:cNvPr id="5" name="Content Placeholder 4">
             <a:extLst>
               <a:ext uri="{FF2B5EF4-FFF2-40B4-BE49-F238E27FC236}">
-                <a16:creationId xmlns:a16="http://schemas.microsoft.com/office/drawing/2014/main" id="{AB07326C-5EB9-421F-B7F2-D267CA4B2FD1}"/>
+                <a16:creationId xmlns:a16="http://schemas.microsoft.com/office/drawing/2014/main" id="{B293731A-91A3-4FCD-9FC2-E14C444EF1F8}"/>
               </a:ext>
             </a:extLst>
           </p:cNvPr>
-          <p:cNvSpPr>
-            <a:spLocks noGrp="1"/>
-          </p:cNvSpPr>
+          <p:cNvPicPr>
+            <a:picLocks noGrp="1" noChangeAspect="1"/>
+          </p:cNvPicPr>
           <p:nvPr>
             <p:ph idx="4294967295"/>
           </p:nvPr>
-        </p:nvSpPr>
+        </p:nvPicPr>
+        <p:blipFill>
+          <a:blip r:embed="rId3"/>
+          <a:stretch>
+            <a:fillRect/>
+          </a:stretch>
+        </p:blipFill>
         <p:spPr>
           <a:xfrm>
-            <a:off x="0" y="2052638"/>
-            <a:ext cx="8947150" cy="4195762"/>
+            <a:off x="658416" y="2052638"/>
+            <a:ext cx="7630318" cy="4195762"/>
           </a:xfrm>
+          <a:prstGeom prst="rect">
+            <a:avLst/>
+          </a:prstGeom>
         </p:spPr>
-        <p:txBody>
-          <a:bodyPr/>
-          <a:lstStyle/>
-          <a:p>
-            <a:endParaRPr lang="en-US" dirty="0"/>
-          </a:p>
-        </p:txBody>
-      </p:sp>
+      </p:pic>
       <p:sp>
         <p:nvSpPr>
           <p:cNvPr id="4" name="TextBox 3">
@@ -7494,4 +8437,299 @@
     </a:ext>
   </a:extLst>
 </a:theme>
+</file>
+
+<file path=ppt/theme/theme2.xml><?xml version="1.0" encoding="utf-8"?>
+<a:theme xmlns:a="http://schemas.openxmlformats.org/drawingml/2006/main" name="Office Theme">
+  <a:themeElements>
+    <a:clrScheme name="Office">
+      <a:dk1>
+        <a:sysClr val="windowText" lastClr="000000"/>
+      </a:dk1>
+      <a:lt1>
+        <a:sysClr val="window" lastClr="FFFFFF"/>
+      </a:lt1>
+      <a:dk2>
+        <a:srgbClr val="44546A"/>
+      </a:dk2>
+      <a:lt2>
+        <a:srgbClr val="E7E6E6"/>
+      </a:lt2>
+      <a:accent1>
+        <a:srgbClr val="4472C4"/>
+      </a:accent1>
+      <a:accent2>
+        <a:srgbClr val="ED7D31"/>
+      </a:accent2>
+      <a:accent3>
+        <a:srgbClr val="A5A5A5"/>
+      </a:accent3>
+      <a:accent4>
+        <a:srgbClr val="FFC000"/>
+      </a:accent4>
+      <a:accent5>
+        <a:srgbClr val="5B9BD5"/>
+      </a:accent5>
+      <a:accent6>
+        <a:srgbClr val="70AD47"/>
+      </a:accent6>
+      <a:hlink>
+        <a:srgbClr val="0563C1"/>
+      </a:hlink>
+      <a:folHlink>
+        <a:srgbClr val="954F72"/>
+      </a:folHlink>
+    </a:clrScheme>
+    <a:fontScheme name="Office">
+      <a:majorFont>
+        <a:latin typeface="Calibri Light" panose="020F0302020204030204"/>
+        <a:ea typeface=""/>
+        <a:cs typeface=""/>
+        <a:font script="Jpan" typeface="游ゴシック Light"/>
+        <a:font script="Hang" typeface="맑은 고딕"/>
+        <a:font script="Hans" typeface="等线 Light"/>
+        <a:font script="Hant" typeface="新細明體"/>
+        <a:font script="Arab" typeface="Times New Roman"/>
+        <a:font script="Hebr" typeface="Times New Roman"/>
+        <a:font script="Thai" typeface="Angsana New"/>
+        <a:font script="Ethi" typeface="Nyala"/>
+        <a:font script="Beng" typeface="Vrinda"/>
+        <a:font script="Gujr" typeface="Shruti"/>
+        <a:font script="Khmr" typeface="MoolBoran"/>
+        <a:font script="Knda" typeface="Tunga"/>
+        <a:font script="Guru" typeface="Raavi"/>
+        <a:font script="Cans" typeface="Euphemia"/>
+        <a:font script="Cher" typeface="Plantagenet Cherokee"/>
+        <a:font script="Yiii" typeface="Microsoft Yi Baiti"/>
+        <a:font script="Tibt" typeface="Microsoft Himalaya"/>
+        <a:font script="Thaa" typeface="MV Boli"/>
+        <a:font script="Deva" typeface="Mangal"/>
+        <a:font script="Telu" typeface="Gautami"/>
+        <a:font script="Taml" typeface="Latha"/>
+        <a:font script="Syrc" typeface="Estrangelo Edessa"/>
+        <a:font script="Orya" typeface="Kalinga"/>
+        <a:font script="Mlym" typeface="Kartika"/>
+        <a:font script="Laoo" typeface="DokChampa"/>
+        <a:font script="Sinh" typeface="Iskoola Pota"/>
+        <a:font script="Mong" typeface="Mongolian Baiti"/>
+        <a:font script="Viet" typeface="Times New Roman"/>
+        <a:font script="Uigh" typeface="Microsoft Uighur"/>
+        <a:font script="Geor" typeface="Sylfaen"/>
+        <a:font script="Armn" typeface="Arial"/>
+        <a:font script="Bugi" typeface="Leelawadee UI"/>
+        <a:font script="Bopo" typeface="Microsoft JhengHei"/>
+        <a:font script="Java" typeface="Javanese Text"/>
+        <a:font script="Lisu" typeface="Segoe UI"/>
+        <a:font script="Mymr" typeface="Myanmar Text"/>
+        <a:font script="Nkoo" typeface="Ebrima"/>
+        <a:font script="Olck" typeface="Nirmala UI"/>
+        <a:font script="Osma" typeface="Ebrima"/>
+        <a:font script="Phag" typeface="Phagspa"/>
+        <a:font script="Syrn" typeface="Estrangelo Edessa"/>
+        <a:font script="Syrj" typeface="Estrangelo Edessa"/>
+        <a:font script="Syre" typeface="Estrangelo Edessa"/>
+        <a:font script="Sora" typeface="Nirmala UI"/>
+        <a:font script="Tale" typeface="Microsoft Tai Le"/>
+        <a:font script="Talu" typeface="Microsoft New Tai Lue"/>
+        <a:font script="Tfng" typeface="Ebrima"/>
+      </a:majorFont>
+      <a:minorFont>
+        <a:latin typeface="Calibri" panose="020F0502020204030204"/>
+        <a:ea typeface=""/>
+        <a:cs typeface=""/>
+        <a:font script="Jpan" typeface="游ゴシック"/>
+        <a:font script="Hang" typeface="맑은 고딕"/>
+        <a:font script="Hans" typeface="等线"/>
+        <a:font script="Hant" typeface="新細明體"/>
+        <a:font script="Arab" typeface="Arial"/>
+        <a:font script="Hebr" typeface="Arial"/>
+        <a:font script="Thai" typeface="Cordia New"/>
+        <a:font script="Ethi" typeface="Nyala"/>
+        <a:font script="Beng" typeface="Vrinda"/>
+        <a:font script="Gujr" typeface="Shruti"/>
+        <a:font script="Khmr" typeface="DaunPenh"/>
+        <a:font script="Knda" typeface="Tunga"/>
+        <a:font script="Guru" typeface="Raavi"/>
+        <a:font script="Cans" typeface="Euphemia"/>
+        <a:font script="Cher" typeface="Plantagenet Cherokee"/>
+        <a:font script="Yiii" typeface="Microsoft Yi Baiti"/>
+        <a:font script="Tibt" typeface="Microsoft Himalaya"/>
+        <a:font script="Thaa" typeface="MV Boli"/>
+        <a:font script="Deva" typeface="Mangal"/>
+        <a:font script="Telu" typeface="Gautami"/>
+        <a:font script="Taml" typeface="Latha"/>
+        <a:font script="Syrc" typeface="Estrangelo Edessa"/>
+        <a:font script="Orya" typeface="Kalinga"/>
+        <a:font script="Mlym" typeface="Kartika"/>
+        <a:font script="Laoo" typeface="DokChampa"/>
+        <a:font script="Sinh" typeface="Iskoola Pota"/>
+        <a:font script="Mong" typeface="Mongolian Baiti"/>
+        <a:font script="Viet" typeface="Arial"/>
+        <a:font script="Uigh" typeface="Microsoft Uighur"/>
+        <a:font script="Geor" typeface="Sylfaen"/>
+        <a:font script="Armn" typeface="Arial"/>
+        <a:font script="Bugi" typeface="Leelawadee UI"/>
+        <a:font script="Bopo" typeface="Microsoft JhengHei"/>
+        <a:font script="Java" typeface="Javanese Text"/>
+        <a:font script="Lisu" typeface="Segoe UI"/>
+        <a:font script="Mymr" typeface="Myanmar Text"/>
+        <a:font script="Nkoo" typeface="Ebrima"/>
+        <a:font script="Olck" typeface="Nirmala UI"/>
+        <a:font script="Osma" typeface="Ebrima"/>
+        <a:font script="Phag" typeface="Phagspa"/>
+        <a:font script="Syrn" typeface="Estrangelo Edessa"/>
+        <a:font script="Syrj" typeface="Estrangelo Edessa"/>
+        <a:font script="Syre" typeface="Estrangelo Edessa"/>
+        <a:font script="Sora" typeface="Nirmala UI"/>
+        <a:font script="Tale" typeface="Microsoft Tai Le"/>
+        <a:font script="Talu" typeface="Microsoft New Tai Lue"/>
+        <a:font script="Tfng" typeface="Ebrima"/>
+      </a:minorFont>
+    </a:fontScheme>
+    <a:fmtScheme name="Office">
+      <a:fillStyleLst>
+        <a:solidFill>
+          <a:schemeClr val="phClr"/>
+        </a:solidFill>
+        <a:gradFill rotWithShape="1">
+          <a:gsLst>
+            <a:gs pos="0">
+              <a:schemeClr val="phClr">
+                <a:lumMod val="110000"/>
+                <a:satMod val="105000"/>
+                <a:tint val="67000"/>
+              </a:schemeClr>
+            </a:gs>
+            <a:gs pos="50000">
+              <a:schemeClr val="phClr">
+                <a:lumMod val="105000"/>
+                <a:satMod val="103000"/>
+                <a:tint val="73000"/>
+              </a:schemeClr>
+            </a:gs>
+            <a:gs pos="100000">
+              <a:schemeClr val="phClr">
+                <a:lumMod val="105000"/>
+                <a:satMod val="109000"/>
+                <a:tint val="81000"/>
+              </a:schemeClr>
+            </a:gs>
+          </a:gsLst>
+          <a:lin ang="5400000" scaled="0"/>
+        </a:gradFill>
+        <a:gradFill rotWithShape="1">
+          <a:gsLst>
+            <a:gs pos="0">
+              <a:schemeClr val="phClr">
+                <a:satMod val="103000"/>
+                <a:lumMod val="102000"/>
+                <a:tint val="94000"/>
+              </a:schemeClr>
+            </a:gs>
+            <a:gs pos="50000">
+              <a:schemeClr val="phClr">
+                <a:satMod val="110000"/>
+                <a:lumMod val="100000"/>
+                <a:shade val="100000"/>
+              </a:schemeClr>
+            </a:gs>
+            <a:gs pos="100000">
+              <a:schemeClr val="phClr">
+                <a:lumMod val="99000"/>
+                <a:satMod val="120000"/>
+                <a:shade val="78000"/>
+              </a:schemeClr>
+            </a:gs>
+          </a:gsLst>
+          <a:lin ang="5400000" scaled="0"/>
+        </a:gradFill>
+      </a:fillStyleLst>
+      <a:lnStyleLst>
+        <a:ln w="6350" cap="flat" cmpd="sng" algn="ctr">
+          <a:solidFill>
+            <a:schemeClr val="phClr"/>
+          </a:solidFill>
+          <a:prstDash val="solid"/>
+          <a:miter lim="800000"/>
+        </a:ln>
+        <a:ln w="12700" cap="flat" cmpd="sng" algn="ctr">
+          <a:solidFill>
+            <a:schemeClr val="phClr"/>
+          </a:solidFill>
+          <a:prstDash val="solid"/>
+          <a:miter lim="800000"/>
+        </a:ln>
+        <a:ln w="19050" cap="flat" cmpd="sng" algn="ctr">
+          <a:solidFill>
+            <a:schemeClr val="phClr"/>
+          </a:solidFill>
+          <a:prstDash val="solid"/>
+          <a:miter lim="800000"/>
+        </a:ln>
+      </a:lnStyleLst>
+      <a:effectStyleLst>
+        <a:effectStyle>
+          <a:effectLst/>
+        </a:effectStyle>
+        <a:effectStyle>
+          <a:effectLst/>
+        </a:effectStyle>
+        <a:effectStyle>
+          <a:effectLst>
+            <a:outerShdw blurRad="57150" dist="19050" dir="5400000" algn="ctr" rotWithShape="0">
+              <a:srgbClr val="000000">
+                <a:alpha val="63000"/>
+              </a:srgbClr>
+            </a:outerShdw>
+          </a:effectLst>
+        </a:effectStyle>
+      </a:effectStyleLst>
+      <a:bgFillStyleLst>
+        <a:solidFill>
+          <a:schemeClr val="phClr"/>
+        </a:solidFill>
+        <a:solidFill>
+          <a:schemeClr val="phClr">
+            <a:tint val="95000"/>
+            <a:satMod val="170000"/>
+          </a:schemeClr>
+        </a:solidFill>
+        <a:gradFill rotWithShape="1">
+          <a:gsLst>
+            <a:gs pos="0">
+              <a:schemeClr val="phClr">
+                <a:tint val="93000"/>
+                <a:satMod val="150000"/>
+                <a:shade val="98000"/>
+                <a:lumMod val="102000"/>
+              </a:schemeClr>
+            </a:gs>
+            <a:gs pos="50000">
+              <a:schemeClr val="phClr">
+                <a:tint val="98000"/>
+                <a:satMod val="130000"/>
+                <a:shade val="90000"/>
+                <a:lumMod val="103000"/>
+              </a:schemeClr>
+            </a:gs>
+            <a:gs pos="100000">
+              <a:schemeClr val="phClr">
+                <a:shade val="63000"/>
+                <a:satMod val="120000"/>
+              </a:schemeClr>
+            </a:gs>
+          </a:gsLst>
+          <a:lin ang="5400000" scaled="0"/>
+        </a:gradFill>
+      </a:bgFillStyleLst>
+    </a:fmtScheme>
+  </a:themeElements>
+  <a:objectDefaults/>
+  <a:extraClrSchemeLst/>
+  <a:extLst>
+    <a:ext uri="{05A4C25C-085E-4340-85A3-A5531E510DB2}">
+      <thm15:themeFamily xmlns:thm15="http://schemas.microsoft.com/office/thememl/2012/main" name="Office Theme" id="{62F939B6-93AF-4DB8-9C6B-D6C7DFDC589F}" vid="{4A3C46E8-61CC-4603-A589-7422A47A8E4A}"/>
+    </a:ext>
+  </a:extLst>
+</a:theme>
 </file>
</xml_diff>